<commit_message>
modification diaporama et finitions
</commit_message>
<xml_diff>
--- a/Presentation Projet HEIvents.pptx
+++ b/Presentation Projet HEIvents.pptx
@@ -5,7 +5,7 @@
     <p:sldMasterId id="2147483660" r:id="rId4"/>
   </p:sldMasterIdLst>
   <p:notesMasterIdLst>
-    <p:notesMasterId r:id="rId17"/>
+    <p:notesMasterId r:id="rId18"/>
   </p:notesMasterIdLst>
   <p:sldIdLst>
     <p:sldId id="256" r:id="rId5"/>
@@ -20,6 +20,7 @@
     <p:sldId id="269" r:id="rId14"/>
     <p:sldId id="265" r:id="rId15"/>
     <p:sldId id="266" r:id="rId16"/>
+    <p:sldId id="271" r:id="rId17"/>
   </p:sldIdLst>
   <p:sldSz cx="12192000" cy="6858000"/>
   <p:notesSz cx="6858000" cy="9144000"/>
@@ -1016,7 +1017,7 @@
           <a:p>
             <a:fld id="{6EE89F92-5B2E-4F3F-AE61-D9D3BF80AD47}" type="datetimeFigureOut">
               <a:rPr lang="fr-FR" smtClean="0"/>
-              <a:t>12/12/2019</a:t>
+              <a:t>13/12/2019</a:t>
             </a:fld>
             <a:endParaRPr lang="fr-FR"/>
           </a:p>
@@ -1612,7 +1613,7 @@
           <a:p>
             <a:fld id="{1843D419-6BCA-4BC0-82EB-1BFEEB9B12A9}" type="datetime1">
               <a:rPr lang="en-US" smtClean="0"/>
-              <a:t>12/12/2019</a:t>
+              <a:t>12/13/2019</a:t>
             </a:fld>
             <a:endParaRPr lang="en-US" dirty="0"/>
           </a:p>
@@ -1935,7 +1936,7 @@
           <a:p>
             <a:fld id="{83EFEC90-C8BD-493F-8DC1-3528C20743E3}" type="datetime1">
               <a:rPr lang="en-US" smtClean="0"/>
-              <a:t>12/12/2019</a:t>
+              <a:t>12/13/2019</a:t>
             </a:fld>
             <a:endParaRPr lang="en-US" dirty="0"/>
           </a:p>
@@ -2186,7 +2187,7 @@
           <a:p>
             <a:fld id="{52A5AB6B-734E-4659-AAB7-60698B5BFC77}" type="datetime1">
               <a:rPr lang="en-US" smtClean="0"/>
-              <a:t>12/12/2019</a:t>
+              <a:t>12/13/2019</a:t>
             </a:fld>
             <a:endParaRPr lang="en-US" dirty="0"/>
           </a:p>
@@ -2528,7 +2529,7 @@
           <a:p>
             <a:fld id="{92FAAAE3-DC9F-42E4-9542-3BCCC5EFBFBD}" type="datetime1">
               <a:rPr lang="en-US" smtClean="0"/>
-              <a:t>12/12/2019</a:t>
+              <a:t>12/13/2019</a:t>
             </a:fld>
             <a:endParaRPr lang="en-US" dirty="0"/>
           </a:p>
@@ -2878,7 +2879,7 @@
           <a:p>
             <a:fld id="{BBCB4203-5A19-4B8E-BA1D-1BBE9952AE0A}" type="datetime1">
               <a:rPr lang="en-US" smtClean="0"/>
-              <a:t>12/12/2019</a:t>
+              <a:t>12/13/2019</a:t>
             </a:fld>
             <a:endParaRPr lang="en-US" dirty="0"/>
           </a:p>
@@ -3255,7 +3256,7 @@
           <a:p>
             <a:fld id="{D8D97ADF-22CE-4851-A5F9-D76FA2811078}" type="datetime1">
               <a:rPr lang="en-US" smtClean="0"/>
-              <a:t>12/12/2019</a:t>
+              <a:t>12/13/2019</a:t>
             </a:fld>
             <a:endParaRPr lang="en-US" dirty="0"/>
           </a:p>
@@ -3728,7 +3729,7 @@
           <a:p>
             <a:fld id="{911E3991-F495-496E-B847-0846571EC63B}" type="datetime1">
               <a:rPr lang="en-US" smtClean="0"/>
-              <a:t>12/12/2019</a:t>
+              <a:t>12/13/2019</a:t>
             </a:fld>
             <a:endParaRPr lang="en-US" dirty="0"/>
           </a:p>
@@ -3935,7 +3936,7 @@
           <a:p>
             <a:fld id="{C75BEC7A-0970-4320-9BAC-080BA6296F3E}" type="datetime1">
               <a:rPr lang="en-US" smtClean="0"/>
-              <a:t>12/12/2019</a:t>
+              <a:t>12/13/2019</a:t>
             </a:fld>
             <a:endParaRPr lang="en-US" dirty="0"/>
           </a:p>
@@ -4148,7 +4149,7 @@
           <a:p>
             <a:fld id="{0F390532-BAE4-4020-97E6-9F17A27A902D}" type="datetime1">
               <a:rPr lang="en-US" smtClean="0"/>
-              <a:t>12/12/2019</a:t>
+              <a:t>12/13/2019</a:t>
             </a:fld>
             <a:endParaRPr lang="en-US" dirty="0"/>
           </a:p>
@@ -4382,7 +4383,7 @@
           <a:p>
             <a:fld id="{98CDCDDD-03D2-487F-96C7-3E7A2FEF6571}" type="datetime1">
               <a:rPr lang="en-US" smtClean="0"/>
-              <a:t>12/12/2019</a:t>
+              <a:t>12/13/2019</a:t>
             </a:fld>
             <a:endParaRPr lang="en-US" dirty="0"/>
           </a:p>
@@ -4632,7 +4633,7 @@
           <a:p>
             <a:fld id="{47CA214C-09B1-4517-85B2-C9C11B3740E5}" type="datetime1">
               <a:rPr lang="en-US" smtClean="0"/>
-              <a:t>12/12/2019</a:t>
+              <a:t>12/13/2019</a:t>
             </a:fld>
             <a:endParaRPr lang="en-US" dirty="0"/>
           </a:p>
@@ -4931,7 +4932,7 @@
           <a:p>
             <a:fld id="{E127C60C-81FF-4CA7-9184-7E15A0913E07}" type="datetime1">
               <a:rPr lang="en-US" smtClean="0"/>
-              <a:t>12/12/2019</a:t>
+              <a:t>12/13/2019</a:t>
             </a:fld>
             <a:endParaRPr lang="en-US" dirty="0"/>
           </a:p>
@@ -5325,7 +5326,7 @@
           <a:p>
             <a:fld id="{3C5DC4CA-E925-4546-A572-E8827B83832B}" type="datetime1">
               <a:rPr lang="en-US" smtClean="0"/>
-              <a:t>12/12/2019</a:t>
+              <a:t>12/13/2019</a:t>
             </a:fld>
             <a:endParaRPr lang="en-US" dirty="0"/>
           </a:p>
@@ -5477,7 +5478,7 @@
           <a:p>
             <a:fld id="{B93CE452-01FD-41D3-A442-1DFD2B9006D2}" type="datetime1">
               <a:rPr lang="en-US" smtClean="0"/>
-              <a:t>12/12/2019</a:t>
+              <a:t>12/13/2019</a:t>
             </a:fld>
             <a:endParaRPr lang="en-US" dirty="0"/>
           </a:p>
@@ -5607,7 +5608,7 @@
           <a:p>
             <a:fld id="{FC1CA1D7-BB93-41F3-B280-84EC3C498B52}" type="datetime1">
               <a:rPr lang="en-US" smtClean="0"/>
-              <a:t>12/12/2019</a:t>
+              <a:t>12/13/2019</a:t>
             </a:fld>
             <a:endParaRPr lang="en-US" dirty="0"/>
           </a:p>
@@ -5864,7 +5865,7 @@
           <a:p>
             <a:fld id="{D9FF76C7-094C-46D2-B041-70FCC6DC3506}" type="datetime1">
               <a:rPr lang="en-US" smtClean="0"/>
-              <a:t>12/12/2019</a:t>
+              <a:t>12/13/2019</a:t>
             </a:fld>
             <a:endParaRPr lang="en-US" dirty="0"/>
           </a:p>
@@ -6178,7 +6179,7 @@
           <a:p>
             <a:fld id="{3F9B7A12-6F0E-4248-8B07-ACF9A0CF7BB6}" type="datetime1">
               <a:rPr lang="en-US" smtClean="0"/>
-              <a:t>12/12/2019</a:t>
+              <a:t>12/13/2019</a:t>
             </a:fld>
             <a:endParaRPr lang="en-US" dirty="0"/>
           </a:p>
@@ -6531,7 +6532,7 @@
           <a:p>
             <a:fld id="{9CD8924B-93A4-4A2E-B016-3DCD44402C6E}" type="datetime1">
               <a:rPr lang="en-US" smtClean="0"/>
-              <a:t>12/12/2019</a:t>
+              <a:t>12/13/2019</a:t>
             </a:fld>
             <a:endParaRPr lang="en-US" dirty="0"/>
           </a:p>
@@ -7764,6 +7765,148 @@
     <p:extLst>
       <p:ext uri="{BB962C8B-B14F-4D97-AF65-F5344CB8AC3E}">
         <p14:creationId xmlns:p14="http://schemas.microsoft.com/office/powerpoint/2010/main" val="3181455519"/>
+      </p:ext>
+    </p:extLst>
+  </p:cSld>
+  <p:clrMapOvr>
+    <a:masterClrMapping/>
+  </p:clrMapOvr>
+  <p:transition spd="slow">
+    <p:push dir="u"/>
+  </p:transition>
+</p:sld>
+</file>
+
+<file path=ppt/slides/slide13.xml><?xml version="1.0" encoding="utf-8"?>
+<p:sld xmlns:a="http://schemas.openxmlformats.org/drawingml/2006/main" xmlns:r="http://schemas.openxmlformats.org/officeDocument/2006/relationships" xmlns:p="http://schemas.openxmlformats.org/presentationml/2006/main">
+  <p:cSld>
+    <p:spTree>
+      <p:nvGrpSpPr>
+        <p:cNvPr id="1" name=""/>
+        <p:cNvGrpSpPr/>
+        <p:nvPr/>
+      </p:nvGrpSpPr>
+      <p:grpSpPr>
+        <a:xfrm>
+          <a:off x="0" y="0"/>
+          <a:ext cx="0" cy="0"/>
+          <a:chOff x="0" y="0"/>
+          <a:chExt cx="0" cy="0"/>
+        </a:xfrm>
+      </p:grpSpPr>
+      <p:sp>
+        <p:nvSpPr>
+          <p:cNvPr id="2" name="Titre 1">
+            <a:extLst>
+              <a:ext uri="{FF2B5EF4-FFF2-40B4-BE49-F238E27FC236}">
+                <a16:creationId xmlns:a16="http://schemas.microsoft.com/office/drawing/2014/main" id="{0371B4AA-51F5-4890-AF0B-C6B3F1642603}"/>
+              </a:ext>
+            </a:extLst>
+          </p:cNvPr>
+          <p:cNvSpPr>
+            <a:spLocks noGrp="1"/>
+          </p:cNvSpPr>
+          <p:nvPr>
+            <p:ph type="title"/>
+          </p:nvPr>
+        </p:nvSpPr>
+        <p:spPr/>
+        <p:txBody>
+          <a:bodyPr/>
+          <a:lstStyle/>
+          <a:p>
+            <a:r>
+              <a:rPr lang="fr-FR" dirty="0"/>
+              <a:t>Pistes d’amélioration</a:t>
+            </a:r>
+          </a:p>
+        </p:txBody>
+      </p:sp>
+      <p:sp>
+        <p:nvSpPr>
+          <p:cNvPr id="3" name="Espace réservé du contenu 2">
+            <a:extLst>
+              <a:ext uri="{FF2B5EF4-FFF2-40B4-BE49-F238E27FC236}">
+                <a16:creationId xmlns:a16="http://schemas.microsoft.com/office/drawing/2014/main" id="{C1502CB7-99F1-4246-B510-B19274BFB5B3}"/>
+              </a:ext>
+            </a:extLst>
+          </p:cNvPr>
+          <p:cNvSpPr>
+            <a:spLocks noGrp="1"/>
+          </p:cNvSpPr>
+          <p:nvPr>
+            <p:ph idx="1"/>
+          </p:nvPr>
+        </p:nvSpPr>
+        <p:spPr/>
+        <p:txBody>
+          <a:bodyPr/>
+          <a:lstStyle/>
+          <a:p>
+            <a:r>
+              <a:rPr lang="fr-FR" dirty="0"/>
+              <a:t>Créer un profil admin global pour le président du BDE et du BDS</a:t>
+            </a:r>
+          </a:p>
+          <a:p>
+            <a:r>
+              <a:rPr lang="fr-FR" dirty="0"/>
+              <a:t>Possibilité de créer de nouvelles 	associations </a:t>
+            </a:r>
+          </a:p>
+          <a:p>
+            <a:r>
+              <a:rPr lang="fr-FR" dirty="0"/>
+              <a:t>Créer une page archive pour les événements passés</a:t>
+            </a:r>
+          </a:p>
+          <a:p>
+            <a:r>
+              <a:rPr lang="fr-FR" dirty="0"/>
+              <a:t>Pouvoir stocker les photos et vidéos liées aux événements  </a:t>
+            </a:r>
+          </a:p>
+          <a:p>
+            <a:r>
+              <a:rPr lang="fr-FR" dirty="0"/>
+              <a:t>Possibilité de filtrer par date </a:t>
+            </a:r>
+          </a:p>
+        </p:txBody>
+      </p:sp>
+      <p:sp>
+        <p:nvSpPr>
+          <p:cNvPr id="4" name="Espace réservé du numéro de diapositive 3">
+            <a:extLst>
+              <a:ext uri="{FF2B5EF4-FFF2-40B4-BE49-F238E27FC236}">
+                <a16:creationId xmlns:a16="http://schemas.microsoft.com/office/drawing/2014/main" id="{0AF087E1-5B66-4011-A5C2-2086BCF0704A}"/>
+              </a:ext>
+            </a:extLst>
+          </p:cNvPr>
+          <p:cNvSpPr>
+            <a:spLocks noGrp="1"/>
+          </p:cNvSpPr>
+          <p:nvPr>
+            <p:ph type="sldNum" sz="quarter" idx="12"/>
+          </p:nvPr>
+        </p:nvSpPr>
+        <p:spPr/>
+        <p:txBody>
+          <a:bodyPr/>
+          <a:lstStyle/>
+          <a:p>
+            <a:fld id="{E97799C9-84D9-46D2-A11E-BCF8A720529D}" type="slidenum">
+              <a:rPr lang="en-US" smtClean="0"/>
+              <a:t>13</a:t>
+            </a:fld>
+            <a:endParaRPr lang="en-US" dirty="0"/>
+          </a:p>
+        </p:txBody>
+      </p:sp>
+    </p:spTree>
+    <p:extLst>
+      <p:ext uri="{BB962C8B-B14F-4D97-AF65-F5344CB8AC3E}">
+        <p14:creationId xmlns:p14="http://schemas.microsoft.com/office/powerpoint/2010/main" val="3342549621"/>
       </p:ext>
     </p:extLst>
   </p:cSld>
@@ -10959,18 +11102,18 @@
 </file>
 
 <file path=customXml/item2.xml><?xml version="1.0" encoding="utf-8"?>
+<p:properties xmlns:p="http://schemas.microsoft.com/office/2006/metadata/properties" xmlns:xsi="http://www.w3.org/2001/XMLSchema-instance" xmlns:pc="http://schemas.microsoft.com/office/infopath/2007/PartnerControls">
+  <documentManagement/>
+</p:properties>
+</file>
+
+<file path=customXml/item3.xml><?xml version="1.0" encoding="utf-8"?>
 <?mso-contentType ?>
 <FormTemplates xmlns="http://schemas.microsoft.com/sharepoint/v3/contenttype/forms">
   <Display>DocumentLibraryForm</Display>
   <Edit>DocumentLibraryForm</Edit>
   <New>DocumentLibraryForm</New>
 </FormTemplates>
-</file>
-
-<file path=customXml/item3.xml><?xml version="1.0" encoding="utf-8"?>
-<p:properties xmlns:p="http://schemas.microsoft.com/office/2006/metadata/properties" xmlns:xsi="http://www.w3.org/2001/XMLSchema-instance" xmlns:pc="http://schemas.microsoft.com/office/infopath/2007/PartnerControls">
-  <documentManagement/>
-</p:properties>
 </file>
 
 <file path=customXml/itemProps1.xml><?xml version="1.0" encoding="utf-8"?>
@@ -10992,18 +11135,18 @@
 </file>
 
 <file path=customXml/itemProps2.xml><?xml version="1.0" encoding="utf-8"?>
-<ds:datastoreItem xmlns:ds="http://schemas.openxmlformats.org/officeDocument/2006/customXml" ds:itemID="{50E4FC58-DB88-4DC3-9343-664CDBC51906}">
-  <ds:schemaRefs>
-    <ds:schemaRef ds:uri="http://schemas.microsoft.com/sharepoint/v3/contenttype/forms"/>
-  </ds:schemaRefs>
-</ds:datastoreItem>
-</file>
-
-<file path=customXml/itemProps3.xml><?xml version="1.0" encoding="utf-8"?>
 <ds:datastoreItem xmlns:ds="http://schemas.openxmlformats.org/officeDocument/2006/customXml" ds:itemID="{5AD5E7EA-6ABD-426F-A0A7-9A64C99BEE49}">
   <ds:schemaRefs>
     <ds:schemaRef ds:uri="http://schemas.microsoft.com/office/2006/metadata/properties"/>
     <ds:schemaRef ds:uri="http://schemas.microsoft.com/office/infopath/2007/PartnerControls"/>
   </ds:schemaRefs>
 </ds:datastoreItem>
+</file>
+
+<file path=customXml/itemProps3.xml><?xml version="1.0" encoding="utf-8"?>
+<ds:datastoreItem xmlns:ds="http://schemas.openxmlformats.org/officeDocument/2006/customXml" ds:itemID="{50E4FC58-DB88-4DC3-9343-664CDBC51906}">
+  <ds:schemaRefs>
+    <ds:schemaRef ds:uri="http://schemas.microsoft.com/sharepoint/v3/contenttype/forms"/>
+  </ds:schemaRefs>
+</ds:datastoreItem>
 </file>
</xml_diff>

<commit_message>
ajout pistes d'améliorations dans ppt
</commit_message>
<xml_diff>
--- a/Presentation Projet HEIvents.pptx
+++ b/Presentation Projet HEIvents.pptx
@@ -7872,6 +7872,12 @@
               <a:t>Possibilité de filtrer par date </a:t>
             </a:r>
           </a:p>
+          <a:p>
+            <a:r>
+              <a:rPr lang="fr-FR" dirty="0"/>
+              <a:t>Confirmation adresse mail pour changement mot de passe </a:t>
+            </a:r>
+          </a:p>
         </p:txBody>
       </p:sp>
       <p:sp>
@@ -11102,18 +11108,18 @@
 </file>
 
 <file path=customXml/item2.xml><?xml version="1.0" encoding="utf-8"?>
-<p:properties xmlns:p="http://schemas.microsoft.com/office/2006/metadata/properties" xmlns:xsi="http://www.w3.org/2001/XMLSchema-instance" xmlns:pc="http://schemas.microsoft.com/office/infopath/2007/PartnerControls">
-  <documentManagement/>
-</p:properties>
-</file>
-
-<file path=customXml/item3.xml><?xml version="1.0" encoding="utf-8"?>
 <?mso-contentType ?>
 <FormTemplates xmlns="http://schemas.microsoft.com/sharepoint/v3/contenttype/forms">
   <Display>DocumentLibraryForm</Display>
   <Edit>DocumentLibraryForm</Edit>
   <New>DocumentLibraryForm</New>
 </FormTemplates>
+</file>
+
+<file path=customXml/item3.xml><?xml version="1.0" encoding="utf-8"?>
+<p:properties xmlns:p="http://schemas.microsoft.com/office/2006/metadata/properties" xmlns:xsi="http://www.w3.org/2001/XMLSchema-instance" xmlns:pc="http://schemas.microsoft.com/office/infopath/2007/PartnerControls">
+  <documentManagement/>
+</p:properties>
 </file>
 
 <file path=customXml/itemProps1.xml><?xml version="1.0" encoding="utf-8"?>
@@ -11135,18 +11141,18 @@
 </file>
 
 <file path=customXml/itemProps2.xml><?xml version="1.0" encoding="utf-8"?>
+<ds:datastoreItem xmlns:ds="http://schemas.openxmlformats.org/officeDocument/2006/customXml" ds:itemID="{50E4FC58-DB88-4DC3-9343-664CDBC51906}">
+  <ds:schemaRefs>
+    <ds:schemaRef ds:uri="http://schemas.microsoft.com/sharepoint/v3/contenttype/forms"/>
+  </ds:schemaRefs>
+</ds:datastoreItem>
+</file>
+
+<file path=customXml/itemProps3.xml><?xml version="1.0" encoding="utf-8"?>
 <ds:datastoreItem xmlns:ds="http://schemas.openxmlformats.org/officeDocument/2006/customXml" ds:itemID="{5AD5E7EA-6ABD-426F-A0A7-9A64C99BEE49}">
   <ds:schemaRefs>
     <ds:schemaRef ds:uri="http://schemas.microsoft.com/office/2006/metadata/properties"/>
     <ds:schemaRef ds:uri="http://schemas.microsoft.com/office/infopath/2007/PartnerControls"/>
   </ds:schemaRefs>
 </ds:datastoreItem>
-</file>
-
-<file path=customXml/itemProps3.xml><?xml version="1.0" encoding="utf-8"?>
-<ds:datastoreItem xmlns:ds="http://schemas.openxmlformats.org/officeDocument/2006/customXml" ds:itemID="{50E4FC58-DB88-4DC3-9343-664CDBC51906}">
-  <ds:schemaRefs>
-    <ds:schemaRef ds:uri="http://schemas.microsoft.com/sharepoint/v3/contenttype/forms"/>
-  </ds:schemaRefs>
-</ds:datastoreItem>
 </file>
</xml_diff>